<commit_message>
add gifs in the ppt
</commit_message>
<xml_diff>
--- a/Dynamic Component in Angular .pptx
+++ b/Dynamic Component in Angular .pptx
@@ -6,10 +6,10 @@
     <p:sldMasterId id="2147483701" r:id="rId2"/>
   </p:sldMasterIdLst>
   <p:notesMasterIdLst>
-    <p:notesMasterId r:id="rId15"/>
+    <p:notesMasterId r:id="rId17"/>
   </p:notesMasterIdLst>
   <p:handoutMasterIdLst>
-    <p:handoutMasterId r:id="rId16"/>
+    <p:handoutMasterId r:id="rId18"/>
   </p:handoutMasterIdLst>
   <p:sldIdLst>
     <p:sldId id="256" r:id="rId3"/>
@@ -23,7 +23,9 @@
     <p:sldId id="377" r:id="rId11"/>
     <p:sldId id="378" r:id="rId12"/>
     <p:sldId id="379" r:id="rId13"/>
-    <p:sldId id="348" r:id="rId14"/>
+    <p:sldId id="384" r:id="rId14"/>
+    <p:sldId id="385" r:id="rId15"/>
+    <p:sldId id="348" r:id="rId16"/>
   </p:sldIdLst>
   <p:sldSz cx="12198350" cy="6858000"/>
   <p:notesSz cx="6858000" cy="9144000"/>
@@ -268,7 +270,7 @@
             <a:fld id="{C3CEDDB9-2955-4D57-9B7C-74EB90EC60C3}" type="datetimeFigureOut">
               <a:rPr lang="zh-CN" altLang="en-US" smtClean="0"/>
               <a:pPr/>
-              <a:t>2019/12/3</a:t>
+              <a:t>2019/12/4</a:t>
             </a:fld>
             <a:endParaRPr lang="zh-CN" altLang="en-US"/>
           </a:p>
@@ -461,7 +463,7 @@
               <a:pPr>
                 <a:defRPr/>
               </a:pPr>
-              <a:t>2019/12/3</a:t>
+              <a:t>2019/12/4</a:t>
             </a:fld>
             <a:endParaRPr lang="zh-CN" altLang="en-US"/>
           </a:p>
@@ -1267,7 +1269,7 @@
               <a:pPr>
                 <a:defRPr/>
               </a:pPr>
-              <a:t>2019/12/3</a:t>
+              <a:t>2019/12/4</a:t>
             </a:fld>
             <a:endParaRPr lang="zh-CN" altLang="en-US"/>
           </a:p>
@@ -1631,7 +1633,7 @@
               <a:pPr>
                 <a:defRPr/>
               </a:pPr>
-              <a:t>2019/12/3</a:t>
+              <a:t>2019/12/4</a:t>
             </a:fld>
             <a:endParaRPr lang="zh-CN" altLang="en-US"/>
           </a:p>
@@ -1979,7 +1981,7 @@
               <a:pPr>
                 <a:defRPr/>
               </a:pPr>
-              <a:t>2019/12/3</a:t>
+              <a:t>2019/12/4</a:t>
             </a:fld>
             <a:endParaRPr lang="zh-CN" altLang="en-US"/>
           </a:p>
@@ -2243,7 +2245,7 @@
               <a:pPr>
                 <a:defRPr/>
               </a:pPr>
-              <a:t>2019/12/3</a:t>
+              <a:t>2019/12/4</a:t>
             </a:fld>
             <a:endParaRPr lang="zh-CN" altLang="en-US"/>
           </a:p>
@@ -2514,7 +2516,7 @@
               <a:pPr>
                 <a:defRPr/>
               </a:pPr>
-              <a:t>2019/12/3</a:t>
+              <a:t>2019/12/4</a:t>
             </a:fld>
             <a:endParaRPr lang="zh-CN" altLang="en-US"/>
           </a:p>
@@ -2815,7 +2817,7 @@
             <a:fld id="{79B3DEAC-C6E9-4E5A-BF92-8A2A909A8AE4}" type="datetimeFigureOut">
               <a:rPr lang="zh-CN" altLang="en-US" smtClean="0"/>
               <a:pPr/>
-              <a:t>2019/12/3</a:t>
+              <a:t>2019/12/4</a:t>
             </a:fld>
             <a:endParaRPr lang="zh-CN" altLang="en-US"/>
           </a:p>
@@ -2982,7 +2984,7 @@
             <a:fld id="{79B3DEAC-C6E9-4E5A-BF92-8A2A909A8AE4}" type="datetimeFigureOut">
               <a:rPr lang="zh-CN" altLang="en-US" smtClean="0"/>
               <a:pPr/>
-              <a:t>2019/12/3</a:t>
+              <a:t>2019/12/4</a:t>
             </a:fld>
             <a:endParaRPr lang="zh-CN" altLang="en-US"/>
           </a:p>
@@ -3225,7 +3227,7 @@
             <a:fld id="{79B3DEAC-C6E9-4E5A-BF92-8A2A909A8AE4}" type="datetimeFigureOut">
               <a:rPr lang="zh-CN" altLang="en-US" smtClean="0"/>
               <a:pPr/>
-              <a:t>2019/12/3</a:t>
+              <a:t>2019/12/4</a:t>
             </a:fld>
             <a:endParaRPr lang="zh-CN" altLang="en-US"/>
           </a:p>
@@ -3510,7 +3512,7 @@
             <a:fld id="{79B3DEAC-C6E9-4E5A-BF92-8A2A909A8AE4}" type="datetimeFigureOut">
               <a:rPr lang="zh-CN" altLang="en-US" smtClean="0"/>
               <a:pPr/>
-              <a:t>2019/12/3</a:t>
+              <a:t>2019/12/4</a:t>
             </a:fld>
             <a:endParaRPr lang="zh-CN" altLang="en-US"/>
           </a:p>
@@ -3929,7 +3931,7 @@
             <a:fld id="{79B3DEAC-C6E9-4E5A-BF92-8A2A909A8AE4}" type="datetimeFigureOut">
               <a:rPr lang="zh-CN" altLang="en-US" smtClean="0"/>
               <a:pPr/>
-              <a:t>2019/12/3</a:t>
+              <a:t>2019/12/4</a:t>
             </a:fld>
             <a:endParaRPr lang="zh-CN" altLang="en-US"/>
           </a:p>
@@ -4107,7 +4109,7 @@
             <a:fld id="{79B3DEAC-C6E9-4E5A-BF92-8A2A909A8AE4}" type="datetimeFigureOut">
               <a:rPr lang="zh-CN" altLang="en-US" smtClean="0"/>
               <a:pPr/>
-              <a:t>2019/12/3</a:t>
+              <a:t>2019/12/4</a:t>
             </a:fld>
             <a:endParaRPr lang="zh-CN" altLang="en-US"/>
           </a:p>
@@ -4199,7 +4201,7 @@
             <a:fld id="{79B3DEAC-C6E9-4E5A-BF92-8A2A909A8AE4}" type="datetimeFigureOut">
               <a:rPr lang="zh-CN" altLang="en-US" smtClean="0"/>
               <a:pPr/>
-              <a:t>2019/12/3</a:t>
+              <a:t>2019/12/4</a:t>
             </a:fld>
             <a:endParaRPr lang="zh-CN" altLang="en-US"/>
           </a:p>
@@ -4473,7 +4475,7 @@
             <a:fld id="{79B3DEAC-C6E9-4E5A-BF92-8A2A909A8AE4}" type="datetimeFigureOut">
               <a:rPr lang="zh-CN" altLang="en-US" smtClean="0"/>
               <a:pPr/>
-              <a:t>2019/12/3</a:t>
+              <a:t>2019/12/4</a:t>
             </a:fld>
             <a:endParaRPr lang="zh-CN" altLang="en-US"/>
           </a:p>
@@ -4723,7 +4725,7 @@
             <a:fld id="{79B3DEAC-C6E9-4E5A-BF92-8A2A909A8AE4}" type="datetimeFigureOut">
               <a:rPr lang="zh-CN" altLang="en-US" smtClean="0"/>
               <a:pPr/>
-              <a:t>2019/12/3</a:t>
+              <a:t>2019/12/4</a:t>
             </a:fld>
             <a:endParaRPr lang="zh-CN" altLang="en-US"/>
           </a:p>
@@ -4890,7 +4892,7 @@
             <a:fld id="{79B3DEAC-C6E9-4E5A-BF92-8A2A909A8AE4}" type="datetimeFigureOut">
               <a:rPr lang="zh-CN" altLang="en-US" smtClean="0"/>
               <a:pPr/>
-              <a:t>2019/12/3</a:t>
+              <a:t>2019/12/4</a:t>
             </a:fld>
             <a:endParaRPr lang="zh-CN" altLang="en-US"/>
           </a:p>
@@ -5067,7 +5069,7 @@
             <a:fld id="{79B3DEAC-C6E9-4E5A-BF92-8A2A909A8AE4}" type="datetimeFigureOut">
               <a:rPr lang="zh-CN" altLang="en-US" smtClean="0"/>
               <a:pPr/>
-              <a:t>2019/12/3</a:t>
+              <a:t>2019/12/4</a:t>
             </a:fld>
             <a:endParaRPr lang="zh-CN" altLang="en-US"/>
           </a:p>
@@ -5952,7 +5954,7 @@
               <a:pPr>
                 <a:defRPr/>
               </a:pPr>
-              <a:t>2019/12/3</a:t>
+              <a:t>2019/12/4</a:t>
             </a:fld>
             <a:endParaRPr lang="zh-CN" altLang="en-US"/>
           </a:p>
@@ -6945,7 +6947,7 @@
             <a:fld id="{79B3DEAC-C6E9-4E5A-BF92-8A2A909A8AE4}" type="datetimeFigureOut">
               <a:rPr lang="zh-CN" altLang="en-US" smtClean="0"/>
               <a:pPr/>
-              <a:t>2019/12/3</a:t>
+              <a:t>2019/12/4</a:t>
             </a:fld>
             <a:endParaRPr lang="zh-CN" altLang="en-US"/>
           </a:p>
@@ -9833,6 +9835,126 @@
           <a:chExt cx="0" cy="0"/>
         </a:xfrm>
       </p:grpSpPr>
+      <p:pic>
+        <p:nvPicPr>
+          <p:cNvPr id="3" name="图片 2"/>
+          <p:cNvPicPr>
+            <a:picLocks noChangeAspect="1"/>
+          </p:cNvPicPr>
+          <p:nvPr/>
+        </p:nvPicPr>
+        <p:blipFill>
+          <a:blip r:embed="rId2">
+            <a:extLst>
+              <a:ext uri="{28A0092B-C50C-407E-A947-70E740481C1C}">
+                <a14:useLocalDpi xmlns:a14="http://schemas.microsoft.com/office/drawing/2010/main" val="0"/>
+              </a:ext>
+            </a:extLst>
+          </a:blip>
+          <a:stretch>
+            <a:fillRect/>
+          </a:stretch>
+        </p:blipFill>
+        <p:spPr>
+          <a:xfrm>
+            <a:off x="1130623" y="260648"/>
+            <a:ext cx="9646915" cy="6046900"/>
+          </a:xfrm>
+          <a:prstGeom prst="rect">
+            <a:avLst/>
+          </a:prstGeom>
+        </p:spPr>
+      </p:pic>
+    </p:spTree>
+    <p:extLst>
+      <p:ext uri="{BB962C8B-B14F-4D97-AF65-F5344CB8AC3E}">
+        <p14:creationId xmlns:p14="http://schemas.microsoft.com/office/powerpoint/2010/main" val="1792615040"/>
+      </p:ext>
+    </p:extLst>
+  </p:cSld>
+  <p:clrMapOvr>
+    <a:masterClrMapping/>
+  </p:clrMapOvr>
+</p:sld>
+</file>
+
+<file path=ppt/slides/slide13.xml><?xml version="1.0" encoding="utf-8"?>
+<p:sld xmlns:a="http://schemas.openxmlformats.org/drawingml/2006/main" xmlns:r="http://schemas.openxmlformats.org/officeDocument/2006/relationships" xmlns:p="http://schemas.openxmlformats.org/presentationml/2006/main">
+  <p:cSld>
+    <p:spTree>
+      <p:nvGrpSpPr>
+        <p:cNvPr id="1" name=""/>
+        <p:cNvGrpSpPr/>
+        <p:nvPr/>
+      </p:nvGrpSpPr>
+      <p:grpSpPr>
+        <a:xfrm>
+          <a:off x="0" y="0"/>
+          <a:ext cx="0" cy="0"/>
+          <a:chOff x="0" y="0"/>
+          <a:chExt cx="0" cy="0"/>
+        </a:xfrm>
+      </p:grpSpPr>
+      <p:pic>
+        <p:nvPicPr>
+          <p:cNvPr id="3" name="图片 2"/>
+          <p:cNvPicPr>
+            <a:picLocks noChangeAspect="1"/>
+          </p:cNvPicPr>
+          <p:nvPr/>
+        </p:nvPicPr>
+        <p:blipFill>
+          <a:blip r:embed="rId2">
+            <a:extLst>
+              <a:ext uri="{28A0092B-C50C-407E-A947-70E740481C1C}">
+                <a14:useLocalDpi xmlns:a14="http://schemas.microsoft.com/office/drawing/2010/main" val="0"/>
+              </a:ext>
+            </a:extLst>
+          </a:blip>
+          <a:stretch>
+            <a:fillRect/>
+          </a:stretch>
+        </p:blipFill>
+        <p:spPr>
+          <a:xfrm>
+            <a:off x="8259415" y="188640"/>
+            <a:ext cx="3884639" cy="6093296"/>
+          </a:xfrm>
+          <a:prstGeom prst="rect">
+            <a:avLst/>
+          </a:prstGeom>
+        </p:spPr>
+      </p:pic>
+    </p:spTree>
+    <p:extLst>
+      <p:ext uri="{BB962C8B-B14F-4D97-AF65-F5344CB8AC3E}">
+        <p14:creationId xmlns:p14="http://schemas.microsoft.com/office/powerpoint/2010/main" val="482045502"/>
+      </p:ext>
+    </p:extLst>
+  </p:cSld>
+  <p:clrMapOvr>
+    <a:masterClrMapping/>
+  </p:clrMapOvr>
+</p:sld>
+</file>
+
+<file path=ppt/slides/slide14.xml><?xml version="1.0" encoding="utf-8"?>
+<p:sld xmlns:a="http://schemas.openxmlformats.org/drawingml/2006/main" xmlns:r="http://schemas.openxmlformats.org/officeDocument/2006/relationships" xmlns:p="http://schemas.openxmlformats.org/presentationml/2006/main">
+  <p:cSld>
+    <p:spTree>
+      <p:nvGrpSpPr>
+        <p:cNvPr id="1" name=""/>
+        <p:cNvGrpSpPr/>
+        <p:nvPr/>
+      </p:nvGrpSpPr>
+      <p:grpSpPr>
+        <a:xfrm>
+          <a:off x="0" y="0"/>
+          <a:ext cx="0" cy="0"/>
+          <a:chOff x="0" y="0"/>
+          <a:chExt cx="0" cy="0"/>
+        </a:xfrm>
+      </p:grpSpPr>
       <p:sp>
         <p:nvSpPr>
           <p:cNvPr id="2" name="Rectangle 7"/>
@@ -10182,33 +10304,7 @@
                 <a:latin typeface="Trebuchet MS" panose="020B0603020202020204" pitchFamily="34" charset="0"/>
                 <a:cs typeface="Calibri" panose="020F0502020204030204" pitchFamily="34" charset="0"/>
               </a:rPr>
-              <a:t>WHAT</a:t>
-            </a:r>
-            <a:r>
-              <a:rPr lang="en-US" altLang="zh-CN" sz="2800" b="1" dirty="0" smtClean="0">
-                <a:solidFill>
-                  <a:schemeClr val="tx1">
-                    <a:lumMod val="65000"/>
-                    <a:lumOff val="35000"/>
-                  </a:schemeClr>
-                </a:solidFill>
-                <a:latin typeface="Trebuchet MS" panose="020B0603020202020204" pitchFamily="34" charset="0"/>
-                <a:cs typeface="Calibri" panose="020F0502020204030204" pitchFamily="34" charset="0"/>
-              </a:rPr>
-              <a:t>’</a:t>
-            </a:r>
-            <a:r>
-              <a:rPr lang="en-US" altLang="zh-CN" sz="2800" b="1" dirty="0" smtClean="0">
-                <a:solidFill>
-                  <a:schemeClr val="tx1">
-                    <a:lumMod val="65000"/>
-                    <a:lumOff val="35000"/>
-                  </a:schemeClr>
-                </a:solidFill>
-                <a:latin typeface="Trebuchet MS" panose="020B0603020202020204" pitchFamily="34" charset="0"/>
-                <a:cs typeface="Calibri" panose="020F0502020204030204" pitchFamily="34" charset="0"/>
-              </a:rPr>
-              <a:t>S DYNAMIC COMPONENTS</a:t>
+              <a:t>WHAT’S DYNAMIC COMPONENTS</a:t>
             </a:r>
             <a:endParaRPr lang="zh-CN" altLang="en-US" sz="2800" b="1" dirty="0">
               <a:solidFill>
@@ -13473,14 +13569,6 @@
               </a:rPr>
               <a:t>How is it instantiated?</a:t>
             </a:r>
-            <a:endParaRPr lang="en-US" altLang="zh-CN" dirty="0" smtClean="0">
-              <a:solidFill>
-                <a:schemeClr val="tx1">
-                  <a:lumMod val="50000"/>
-                  <a:lumOff val="50000"/>
-                </a:schemeClr>
-              </a:solidFill>
-            </a:endParaRPr>
           </a:p>
         </p:txBody>
       </p:sp>
@@ -13660,16 +13748,7 @@
                 </a:solidFill>
                 <a:latin typeface="Consolas" panose="020B0609020204030204" pitchFamily="49" charset="0"/>
               </a:rPr>
-              <a:t> }) </a:t>
-            </a:r>
-            <a:r>
-              <a:rPr lang="en-US" altLang="zh-CN" sz="1400" dirty="0">
-                <a:solidFill>
-                  <a:srgbClr val="C5C8C6"/>
-                </a:solidFill>
-                <a:latin typeface="Consolas" panose="020B0609020204030204" pitchFamily="49" charset="0"/>
-              </a:rPr>
-              <a:t>container;</a:t>
+              <a:t> }) container;</a:t>
             </a:r>
             <a:endParaRPr lang="en-US" altLang="zh-CN" sz="1400" dirty="0" smtClean="0">
               <a:solidFill>
@@ -14222,14 +14301,6 @@
               </a:rPr>
               <a:t>How to pass inputs?</a:t>
             </a:r>
-            <a:endParaRPr lang="en-US" altLang="zh-CN" dirty="0" smtClean="0">
-              <a:solidFill>
-                <a:schemeClr val="tx1">
-                  <a:lumMod val="50000"/>
-                  <a:lumOff val="50000"/>
-                </a:schemeClr>
-              </a:solidFill>
-            </a:endParaRPr>
           </a:p>
         </p:txBody>
       </p:sp>
@@ -14270,14 +14341,6 @@
               </a:rPr>
               <a:t>How to bind to outputs?</a:t>
             </a:r>
-            <a:endParaRPr lang="en-US" altLang="zh-CN" dirty="0" smtClean="0">
-              <a:solidFill>
-                <a:schemeClr val="tx1">
-                  <a:lumMod val="50000"/>
-                  <a:lumOff val="50000"/>
-                </a:schemeClr>
-              </a:solidFill>
-            </a:endParaRPr>
           </a:p>
         </p:txBody>
       </p:sp>

</xml_diff>